<commit_message>
Images Updates, Script Updates, Power Point Update
</commit_message>
<xml_diff>
--- a/Images/Figures_PPT/ComponentsChlorophytaPieChart.pptx
+++ b/Images/Figures_PPT/ComponentsChlorophytaPieChart.pptx
@@ -5,7 +5,7 @@
     <p:sldMasterId id="2147483648" r:id="rId1"/>
   </p:sldMasterIdLst>
   <p:sldIdLst>
-    <p:sldId id="256" r:id="rId2"/>
+    <p:sldId id="256" r:id="rId8"/>
   </p:sldIdLst>
   <p:sldSz cx="9144000" cy="6858000" type="screen4x3"/>
   <p:notesSz cx="6858000" cy="9144000"/>
@@ -107,22 +107,6 @@
       </a:defRPr>
     </a:lvl9pPr>
   </p:defaultTextStyle>
-  <p:extLst>
-    <p:ext uri="{EFAFB233-063F-42B5-8137-9DF3F51BA10A}">
-      <p15:sldGuideLst xmlns:p15="http://schemas.microsoft.com/office/powerpoint/2012/main">
-        <p15:guide id="1" orient="horz" pos="2160">
-          <p15:clr>
-            <a:srgbClr val="A4A3A4"/>
-          </p15:clr>
-        </p15:guide>
-        <p15:guide id="2" pos="2880">
-          <p15:clr>
-            <a:srgbClr val="A4A3A4"/>
-          </p15:clr>
-        </p15:guide>
-      </p15:sldGuideLst>
-    </p:ext>
-  </p:extLst>
 </p:presentation>
 </file>
 
@@ -164,7 +148,7 @@
           <a:lstStyle/>
           <a:p>
             <a:r>
-              <a:rPr lang="en-US"/>
+              <a:rPr lang="en-US" smtClean="0"/>
               <a:t>Click to edit Master title style</a:t>
             </a:r>
             <a:endParaRPr lang="en-GB"/>
@@ -283,7 +267,7 @@
           </a:lstStyle>
           <a:p>
             <a:r>
-              <a:rPr lang="en-US"/>
+              <a:rPr lang="en-US" smtClean="0"/>
               <a:t>Click to edit Master subtitle style</a:t>
             </a:r>
             <a:endParaRPr lang="en-GB"/>
@@ -307,7 +291,7 @@
           <a:p>
             <a:fld id="{E6744CE3-0875-4B69-89C0-6F72D8139561}" type="datetimeFigureOut">
               <a:rPr lang="en-GB" smtClean="0"/>
-              <a:t>22/05/2025</a:t>
+              <a:t>26/05/17</a:t>
             </a:fld>
             <a:endParaRPr lang="en-GB"/>
           </a:p>
@@ -401,7 +385,7 @@
           <a:lstStyle/>
           <a:p>
             <a:r>
-              <a:rPr lang="en-US"/>
+              <a:rPr lang="en-US" smtClean="0"/>
               <a:t>Click to edit Master title style</a:t>
             </a:r>
             <a:endParaRPr lang="en-GB"/>
@@ -425,35 +409,35 @@
           <a:p>
             <a:pPr lvl="0"/>
             <a:r>
-              <a:rPr lang="en-US"/>
+              <a:rPr lang="en-US" smtClean="0"/>
               <a:t>Click to edit Master text styles</a:t>
             </a:r>
           </a:p>
           <a:p>
             <a:pPr lvl="1"/>
             <a:r>
-              <a:rPr lang="en-US"/>
+              <a:rPr lang="en-US" smtClean="0"/>
               <a:t>Second level</a:t>
             </a:r>
           </a:p>
           <a:p>
             <a:pPr lvl="2"/>
             <a:r>
-              <a:rPr lang="en-US"/>
+              <a:rPr lang="en-US" smtClean="0"/>
               <a:t>Third level</a:t>
             </a:r>
           </a:p>
           <a:p>
             <a:pPr lvl="3"/>
             <a:r>
-              <a:rPr lang="en-US"/>
+              <a:rPr lang="en-US" smtClean="0"/>
               <a:t>Fourth level</a:t>
             </a:r>
           </a:p>
           <a:p>
             <a:pPr lvl="4"/>
             <a:r>
-              <a:rPr lang="en-US"/>
+              <a:rPr lang="en-US" smtClean="0"/>
               <a:t>Fifth level</a:t>
             </a:r>
             <a:endParaRPr lang="en-GB"/>
@@ -477,7 +461,7 @@
           <a:p>
             <a:fld id="{E6744CE3-0875-4B69-89C0-6F72D8139561}" type="datetimeFigureOut">
               <a:rPr lang="en-GB" smtClean="0"/>
-              <a:t>22/05/2025</a:t>
+              <a:t>26/05/17</a:t>
             </a:fld>
             <a:endParaRPr lang="en-GB"/>
           </a:p>
@@ -580,7 +564,7 @@
           </a:lstStyle>
           <a:p>
             <a:r>
-              <a:rPr lang="en-US"/>
+              <a:rPr lang="en-US" smtClean="0"/>
               <a:t>Click to edit Master title style</a:t>
             </a:r>
             <a:endParaRPr lang="en-GB"/>
@@ -700,7 +684,7 @@
           <a:p>
             <a:pPr lvl="0"/>
             <a:r>
-              <a:rPr lang="en-US"/>
+              <a:rPr lang="en-US" smtClean="0"/>
               <a:t>Click to edit Master text styles</a:t>
             </a:r>
           </a:p>
@@ -723,7 +707,7 @@
           <a:p>
             <a:fld id="{E6744CE3-0875-4B69-89C0-6F72D8139561}" type="datetimeFigureOut">
               <a:rPr lang="en-GB" smtClean="0"/>
-              <a:t>22/05/2025</a:t>
+              <a:t>26/05/17</a:t>
             </a:fld>
             <a:endParaRPr lang="en-GB"/>
           </a:p>
@@ -817,7 +801,7 @@
           <a:lstStyle/>
           <a:p>
             <a:r>
-              <a:rPr lang="en-US"/>
+              <a:rPr lang="en-US" smtClean="0"/>
               <a:t>Click to edit Master title style</a:t>
             </a:r>
             <a:endParaRPr lang="en-GB"/>
@@ -874,35 +858,35 @@
           <a:p>
             <a:pPr lvl="0"/>
             <a:r>
-              <a:rPr lang="en-US"/>
+              <a:rPr lang="en-US" smtClean="0"/>
               <a:t>Click to edit Master text styles</a:t>
             </a:r>
           </a:p>
           <a:p>
             <a:pPr lvl="1"/>
             <a:r>
-              <a:rPr lang="en-US"/>
+              <a:rPr lang="en-US" smtClean="0"/>
               <a:t>Second level</a:t>
             </a:r>
           </a:p>
           <a:p>
             <a:pPr lvl="2"/>
             <a:r>
-              <a:rPr lang="en-US"/>
+              <a:rPr lang="en-US" smtClean="0"/>
               <a:t>Third level</a:t>
             </a:r>
           </a:p>
           <a:p>
             <a:pPr lvl="3"/>
             <a:r>
-              <a:rPr lang="en-US"/>
+              <a:rPr lang="en-US" smtClean="0"/>
               <a:t>Fourth level</a:t>
             </a:r>
           </a:p>
           <a:p>
             <a:pPr lvl="4"/>
             <a:r>
-              <a:rPr lang="en-US"/>
+              <a:rPr lang="en-US" smtClean="0"/>
               <a:t>Fifth level</a:t>
             </a:r>
             <a:endParaRPr lang="en-GB"/>
@@ -959,35 +943,35 @@
           <a:p>
             <a:pPr lvl="0"/>
             <a:r>
-              <a:rPr lang="en-US"/>
+              <a:rPr lang="en-US" smtClean="0"/>
               <a:t>Click to edit Master text styles</a:t>
             </a:r>
           </a:p>
           <a:p>
             <a:pPr lvl="1"/>
             <a:r>
-              <a:rPr lang="en-US"/>
+              <a:rPr lang="en-US" smtClean="0"/>
               <a:t>Second level</a:t>
             </a:r>
           </a:p>
           <a:p>
             <a:pPr lvl="2"/>
             <a:r>
-              <a:rPr lang="en-US"/>
+              <a:rPr lang="en-US" smtClean="0"/>
               <a:t>Third level</a:t>
             </a:r>
           </a:p>
           <a:p>
             <a:pPr lvl="3"/>
             <a:r>
-              <a:rPr lang="en-US"/>
+              <a:rPr lang="en-US" smtClean="0"/>
               <a:t>Fourth level</a:t>
             </a:r>
           </a:p>
           <a:p>
             <a:pPr lvl="4"/>
             <a:r>
-              <a:rPr lang="en-US"/>
+              <a:rPr lang="en-US" smtClean="0"/>
               <a:t>Fifth level</a:t>
             </a:r>
             <a:endParaRPr lang="en-GB"/>
@@ -1011,7 +995,7 @@
           <a:p>
             <a:fld id="{E6744CE3-0875-4B69-89C0-6F72D8139561}" type="datetimeFigureOut">
               <a:rPr lang="en-GB" smtClean="0"/>
-              <a:t>22/05/2025</a:t>
+              <a:t>26/05/17</a:t>
             </a:fld>
             <a:endParaRPr lang="en-GB"/>
           </a:p>
@@ -1109,7 +1093,7 @@
           </a:lstStyle>
           <a:p>
             <a:r>
-              <a:rPr lang="en-US"/>
+              <a:rPr lang="en-US" smtClean="0"/>
               <a:t>Click to edit Master title style</a:t>
             </a:r>
             <a:endParaRPr lang="en-GB"/>
@@ -1175,7 +1159,7 @@
           <a:p>
             <a:pPr lvl="0"/>
             <a:r>
-              <a:rPr lang="en-US"/>
+              <a:rPr lang="en-US" smtClean="0"/>
               <a:t>Click to edit Master text styles</a:t>
             </a:r>
           </a:p>
@@ -1231,35 +1215,35 @@
           <a:p>
             <a:pPr lvl="0"/>
             <a:r>
-              <a:rPr lang="en-US"/>
+              <a:rPr lang="en-US" smtClean="0"/>
               <a:t>Click to edit Master text styles</a:t>
             </a:r>
           </a:p>
           <a:p>
             <a:pPr lvl="1"/>
             <a:r>
-              <a:rPr lang="en-US"/>
+              <a:rPr lang="en-US" smtClean="0"/>
               <a:t>Second level</a:t>
             </a:r>
           </a:p>
           <a:p>
             <a:pPr lvl="2"/>
             <a:r>
-              <a:rPr lang="en-US"/>
+              <a:rPr lang="en-US" smtClean="0"/>
               <a:t>Third level</a:t>
             </a:r>
           </a:p>
           <a:p>
             <a:pPr lvl="3"/>
             <a:r>
-              <a:rPr lang="en-US"/>
+              <a:rPr lang="en-US" smtClean="0"/>
               <a:t>Fourth level</a:t>
             </a:r>
           </a:p>
           <a:p>
             <a:pPr lvl="4"/>
             <a:r>
-              <a:rPr lang="en-US"/>
+              <a:rPr lang="en-US" smtClean="0"/>
               <a:t>Fifth level</a:t>
             </a:r>
             <a:endParaRPr lang="en-GB"/>
@@ -1325,7 +1309,7 @@
           <a:p>
             <a:pPr lvl="0"/>
             <a:r>
-              <a:rPr lang="en-US"/>
+              <a:rPr lang="en-US" smtClean="0"/>
               <a:t>Click to edit Master text styles</a:t>
             </a:r>
           </a:p>
@@ -1381,35 +1365,35 @@
           <a:p>
             <a:pPr lvl="0"/>
             <a:r>
-              <a:rPr lang="en-US"/>
+              <a:rPr lang="en-US" smtClean="0"/>
               <a:t>Click to edit Master text styles</a:t>
             </a:r>
           </a:p>
           <a:p>
             <a:pPr lvl="1"/>
             <a:r>
-              <a:rPr lang="en-US"/>
+              <a:rPr lang="en-US" smtClean="0"/>
               <a:t>Second level</a:t>
             </a:r>
           </a:p>
           <a:p>
             <a:pPr lvl="2"/>
             <a:r>
-              <a:rPr lang="en-US"/>
+              <a:rPr lang="en-US" smtClean="0"/>
               <a:t>Third level</a:t>
             </a:r>
           </a:p>
           <a:p>
             <a:pPr lvl="3"/>
             <a:r>
-              <a:rPr lang="en-US"/>
+              <a:rPr lang="en-US" smtClean="0"/>
               <a:t>Fourth level</a:t>
             </a:r>
           </a:p>
           <a:p>
             <a:pPr lvl="4"/>
             <a:r>
-              <a:rPr lang="en-US"/>
+              <a:rPr lang="en-US" smtClean="0"/>
               <a:t>Fifth level</a:t>
             </a:r>
             <a:endParaRPr lang="en-GB"/>
@@ -1433,7 +1417,7 @@
           <a:p>
             <a:fld id="{E6744CE3-0875-4B69-89C0-6F72D8139561}" type="datetimeFigureOut">
               <a:rPr lang="en-GB" smtClean="0"/>
-              <a:t>22/05/2025</a:t>
+              <a:t>26/05/17</a:t>
             </a:fld>
             <a:endParaRPr lang="en-GB"/>
           </a:p>
@@ -1527,7 +1511,7 @@
           <a:lstStyle/>
           <a:p>
             <a:r>
-              <a:rPr lang="en-US"/>
+              <a:rPr lang="en-US" smtClean="0"/>
               <a:t>Click to edit Master title style</a:t>
             </a:r>
             <a:endParaRPr lang="en-GB"/>
@@ -1551,7 +1535,7 @@
           <a:p>
             <a:fld id="{E6744CE3-0875-4B69-89C0-6F72D8139561}" type="datetimeFigureOut">
               <a:rPr lang="en-GB" smtClean="0"/>
-              <a:t>22/05/2025</a:t>
+              <a:t>26/05/17</a:t>
             </a:fld>
             <a:endParaRPr lang="en-GB"/>
           </a:p>
@@ -1646,7 +1630,7 @@
           <a:p>
             <a:fld id="{E6744CE3-0875-4B69-89C0-6F72D8139561}" type="datetimeFigureOut">
               <a:rPr lang="en-GB" smtClean="0"/>
-              <a:t>22/05/2025</a:t>
+              <a:t>26/05/17</a:t>
             </a:fld>
             <a:endParaRPr lang="en-GB"/>
           </a:p>
@@ -1755,7 +1739,7 @@
           <a:lstStyle/>
           <a:p>
             <a:r>
-              <a:rPr lang="en-US"/>
+              <a:rPr lang="en-US" smtClean="0"/>
               <a:t>Click to edit Master title style</a:t>
             </a:r>
             <a:endParaRPr lang="en-GB"/>
@@ -1789,35 +1773,35 @@
           <a:p>
             <a:pPr lvl="0"/>
             <a:r>
-              <a:rPr lang="en-US"/>
+              <a:rPr lang="en-US" smtClean="0"/>
               <a:t>Click to edit Master text styles</a:t>
             </a:r>
           </a:p>
           <a:p>
             <a:pPr lvl="1"/>
             <a:r>
-              <a:rPr lang="en-US"/>
+              <a:rPr lang="en-US" smtClean="0"/>
               <a:t>Second level</a:t>
             </a:r>
           </a:p>
           <a:p>
             <a:pPr lvl="2"/>
             <a:r>
-              <a:rPr lang="en-US"/>
+              <a:rPr lang="en-US" smtClean="0"/>
               <a:t>Third level</a:t>
             </a:r>
           </a:p>
           <a:p>
             <a:pPr lvl="3"/>
             <a:r>
-              <a:rPr lang="en-US"/>
+              <a:rPr lang="en-US" smtClean="0"/>
               <a:t>Fourth level</a:t>
             </a:r>
           </a:p>
           <a:p>
             <a:pPr lvl="4"/>
             <a:r>
-              <a:rPr lang="en-US"/>
+              <a:rPr lang="en-US" smtClean="0"/>
               <a:t>Fifth level</a:t>
             </a:r>
             <a:endParaRPr lang="en-GB"/>
@@ -1859,7 +1843,7 @@
           <a:p>
             <a:fld id="{E6744CE3-0875-4B69-89C0-6F72D8139561}" type="datetimeFigureOut">
               <a:rPr lang="en-GB" smtClean="0"/>
-              <a:t>22/05/2025</a:t>
+              <a:t>26/05/17</a:t>
             </a:fld>
             <a:endParaRPr lang="en-GB"/>
           </a:p>
@@ -2230,15 +2214,42 @@
           <a:chExt cx="0" cy="0"/>
         </a:xfrm>
       </p:grpSpPr>
-      <p:grpSp>
+      <p:sp>
+        <p:nvSpPr>
+          <p:cNvPr id="2" name="Title 1"/>
+          <p:cNvSpPr>
+            <a:spLocks noGrp="1"/>
+          </p:cNvSpPr>
+          <p:nvPr>
+            <p:ph type="title"/>
+          </p:nvPr>
+        </p:nvSpPr>
+        <p:spPr>
+          <a:xfrm>
+            <a:off x="457200" y="274638"/>
+            <a:ext cx="8229600" cy="1143000"/>
+          </a:xfrm>
+        </p:spPr>
+        <p:txBody>
+          <a:bodyPr/>
+          <a:lstStyle/>
+          <a:p>
+            <a:r>
+              <a:rPr/>
+              <a:t/>
+            </a:r>
+          </a:p>
+        </p:txBody>
+      </p:sp>
+      <p:grpSp xmlns:pic="http://schemas.openxmlformats.org/drawingml/2006/picture">
         <p:nvGrpSpPr>
-          <p:cNvPr id="3" name="Group 2"/>
+          <p:cNvPr id="3" name=""/>
           <p:cNvGrpSpPr/>
           <p:nvPr/>
         </p:nvGrpSpPr>
         <p:grpSpPr>
           <a:xfrm>
-            <a:off x="0" y="0"/>
+            <a:off x="914400" y="914400"/>
             <a:ext cx="9144000" cy="6400800"/>
             <a:chOff x="914400" y="914400"/>
             <a:chExt cx="9144000" cy="6400800"/>
@@ -2276,9 +2287,7 @@
           <p:txBody>
             <a:bodyPr/>
             <a:lstStyle/>
-            <a:p>
-              <a:endParaRPr/>
-            </a:p>
+            <a:p/>
           </p:txBody>
         </p:sp>
         <p:sp>
@@ -2292,9 +2301,743 @@
               <a:off x="3012875" y="1749568"/>
               <a:ext cx="4947049" cy="4946871"/>
             </a:xfrm>
-            <a:prstGeom prst="ellipse">
+            <a:custGeom>
               <a:avLst/>
-            </a:prstGeom>
+              <a:pathLst>
+                <a:path w="4947049" h="4946871">
+                  <a:moveTo>
+                    <a:pt x="2473524" y="2473613"/>
+                  </a:moveTo>
+                  <a:lnTo>
+                    <a:pt x="2473524" y="2388316"/>
+                  </a:lnTo>
+                  <a:lnTo>
+                    <a:pt x="2473524" y="2303019"/>
+                  </a:lnTo>
+                  <a:lnTo>
+                    <a:pt x="2473524" y="2217722"/>
+                  </a:lnTo>
+                  <a:lnTo>
+                    <a:pt x="2473524" y="2132425"/>
+                  </a:lnTo>
+                  <a:lnTo>
+                    <a:pt x="2473524" y="2047128"/>
+                  </a:lnTo>
+                  <a:lnTo>
+                    <a:pt x="2473524" y="1961831"/>
+                  </a:lnTo>
+                  <a:lnTo>
+                    <a:pt x="2473524" y="1876534"/>
+                  </a:lnTo>
+                  <a:lnTo>
+                    <a:pt x="2473524" y="1791237"/>
+                  </a:lnTo>
+                  <a:lnTo>
+                    <a:pt x="2473524" y="1705940"/>
+                  </a:lnTo>
+                  <a:lnTo>
+                    <a:pt x="2473524" y="1620643"/>
+                  </a:lnTo>
+                  <a:lnTo>
+                    <a:pt x="2473524" y="1535346"/>
+                  </a:lnTo>
+                  <a:lnTo>
+                    <a:pt x="2473524" y="1450049"/>
+                  </a:lnTo>
+                  <a:lnTo>
+                    <a:pt x="2473524" y="1364752"/>
+                  </a:lnTo>
+                  <a:lnTo>
+                    <a:pt x="2473524" y="1279455"/>
+                  </a:lnTo>
+                  <a:lnTo>
+                    <a:pt x="2473524" y="1194158"/>
+                  </a:lnTo>
+                  <a:lnTo>
+                    <a:pt x="2473524" y="1108861"/>
+                  </a:lnTo>
+                  <a:lnTo>
+                    <a:pt x="2473524" y="1023564"/>
+                  </a:lnTo>
+                  <a:lnTo>
+                    <a:pt x="2473524" y="938267"/>
+                  </a:lnTo>
+                  <a:lnTo>
+                    <a:pt x="2473524" y="852970"/>
+                  </a:lnTo>
+                  <a:lnTo>
+                    <a:pt x="2473524" y="767673"/>
+                  </a:lnTo>
+                  <a:lnTo>
+                    <a:pt x="2473524" y="682376"/>
+                  </a:lnTo>
+                  <a:lnTo>
+                    <a:pt x="2473524" y="597079"/>
+                  </a:lnTo>
+                  <a:lnTo>
+                    <a:pt x="2473524" y="511782"/>
+                  </a:lnTo>
+                  <a:lnTo>
+                    <a:pt x="2473524" y="426485"/>
+                  </a:lnTo>
+                  <a:lnTo>
+                    <a:pt x="2473524" y="341188"/>
+                  </a:lnTo>
+                  <a:lnTo>
+                    <a:pt x="2473524" y="255891"/>
+                  </a:lnTo>
+                  <a:lnTo>
+                    <a:pt x="2473524" y="170594"/>
+                  </a:lnTo>
+                  <a:lnTo>
+                    <a:pt x="2473524" y="85297"/>
+                  </a:lnTo>
+                  <a:lnTo>
+                    <a:pt x="2473524" y="0"/>
+                  </a:lnTo>
+                  <a:lnTo>
+                    <a:pt x="2389529" y="1426"/>
+                  </a:lnTo>
+                  <a:lnTo>
+                    <a:pt x="2305630" y="5704"/>
+                  </a:lnTo>
+                  <a:lnTo>
+                    <a:pt x="2221925" y="12828"/>
+                  </a:lnTo>
+                  <a:lnTo>
+                    <a:pt x="2138510" y="22791"/>
+                  </a:lnTo>
+                  <a:lnTo>
+                    <a:pt x="2055481" y="35580"/>
+                  </a:lnTo>
+                  <a:lnTo>
+                    <a:pt x="1972935" y="51182"/>
+                  </a:lnTo>
+                  <a:lnTo>
+                    <a:pt x="1890966" y="69577"/>
+                  </a:lnTo>
+                  <a:lnTo>
+                    <a:pt x="1809669" y="90745"/>
+                  </a:lnTo>
+                  <a:lnTo>
+                    <a:pt x="1729138" y="114661"/>
+                  </a:lnTo>
+                  <a:lnTo>
+                    <a:pt x="1649465" y="141299"/>
+                  </a:lnTo>
+                  <a:lnTo>
+                    <a:pt x="1570743" y="170626"/>
+                  </a:lnTo>
+                  <a:lnTo>
+                    <a:pt x="1493062" y="202609"/>
+                  </a:lnTo>
+                  <a:lnTo>
+                    <a:pt x="1416511" y="237212"/>
+                  </a:lnTo>
+                  <a:lnTo>
+                    <a:pt x="1341180" y="274395"/>
+                  </a:lnTo>
+                  <a:lnTo>
+                    <a:pt x="1267155" y="314114"/>
+                  </a:lnTo>
+                  <a:lnTo>
+                    <a:pt x="1194522" y="356323"/>
+                  </a:lnTo>
+                  <a:lnTo>
+                    <a:pt x="1123363" y="400975"/>
+                  </a:lnTo>
+                  <a:lnTo>
+                    <a:pt x="1053762" y="448017"/>
+                  </a:lnTo>
+                  <a:lnTo>
+                    <a:pt x="985798" y="497396"/>
+                  </a:lnTo>
+                  <a:lnTo>
+                    <a:pt x="919551" y="549053"/>
+                  </a:lnTo>
+                  <a:lnTo>
+                    <a:pt x="855095" y="602931"/>
+                  </a:lnTo>
+                  <a:lnTo>
+                    <a:pt x="792506" y="658966"/>
+                  </a:lnTo>
+                  <a:lnTo>
+                    <a:pt x="731856" y="717094"/>
+                  </a:lnTo>
+                  <a:lnTo>
+                    <a:pt x="673215" y="777249"/>
+                  </a:lnTo>
+                  <a:lnTo>
+                    <a:pt x="616651" y="839359"/>
+                  </a:lnTo>
+                  <a:lnTo>
+                    <a:pt x="562228" y="903355"/>
+                  </a:lnTo>
+                  <a:lnTo>
+                    <a:pt x="510009" y="969162"/>
+                  </a:lnTo>
+                  <a:lnTo>
+                    <a:pt x="460056" y="1036704"/>
+                  </a:lnTo>
+                  <a:lnTo>
+                    <a:pt x="412424" y="1105903"/>
+                  </a:lnTo>
+                  <a:lnTo>
+                    <a:pt x="367170" y="1176680"/>
+                  </a:lnTo>
+                  <a:lnTo>
+                    <a:pt x="324345" y="1248952"/>
+                  </a:lnTo>
+                  <a:lnTo>
+                    <a:pt x="283999" y="1322637"/>
+                  </a:lnTo>
+                  <a:lnTo>
+                    <a:pt x="246179" y="1397650"/>
+                  </a:lnTo>
+                  <a:lnTo>
+                    <a:pt x="210927" y="1473904"/>
+                  </a:lnTo>
+                  <a:lnTo>
+                    <a:pt x="178285" y="1551310"/>
+                  </a:lnTo>
+                  <a:lnTo>
+                    <a:pt x="148290" y="1629781"/>
+                  </a:lnTo>
+                  <a:lnTo>
+                    <a:pt x="120978" y="1709225"/>
+                  </a:lnTo>
+                  <a:lnTo>
+                    <a:pt x="96378" y="1789550"/>
+                  </a:lnTo>
+                  <a:lnTo>
+                    <a:pt x="74521" y="1870664"/>
+                  </a:lnTo>
+                  <a:lnTo>
+                    <a:pt x="55430" y="1952474"/>
+                  </a:lnTo>
+                  <a:lnTo>
+                    <a:pt x="39128" y="2034885"/>
+                  </a:lnTo>
+                  <a:lnTo>
+                    <a:pt x="25635" y="2117802"/>
+                  </a:lnTo>
+                  <a:lnTo>
+                    <a:pt x="14964" y="2201129"/>
+                  </a:lnTo>
+                  <a:lnTo>
+                    <a:pt x="7129" y="2284771"/>
+                  </a:lnTo>
+                  <a:lnTo>
+                    <a:pt x="2139" y="2368630"/>
+                  </a:lnTo>
+                  <a:lnTo>
+                    <a:pt x="0" y="2452611"/>
+                  </a:lnTo>
+                  <a:lnTo>
+                    <a:pt x="713" y="2536615"/>
+                  </a:lnTo>
+                  <a:lnTo>
+                    <a:pt x="4278" y="2620547"/>
+                  </a:lnTo>
+                  <a:lnTo>
+                    <a:pt x="10692" y="2704310"/>
+                  </a:lnTo>
+                  <a:lnTo>
+                    <a:pt x="19946" y="2787806"/>
+                  </a:lnTo>
+                  <a:lnTo>
+                    <a:pt x="32029" y="2870941"/>
+                  </a:lnTo>
+                  <a:lnTo>
+                    <a:pt x="46929" y="2953616"/>
+                  </a:lnTo>
+                  <a:lnTo>
+                    <a:pt x="64628" y="3035739"/>
+                  </a:lnTo>
+                  <a:lnTo>
+                    <a:pt x="85105" y="3117212"/>
+                  </a:lnTo>
+                  <a:lnTo>
+                    <a:pt x="108337" y="3197944"/>
+                  </a:lnTo>
+                  <a:lnTo>
+                    <a:pt x="134297" y="3277840"/>
+                  </a:lnTo>
+                  <a:lnTo>
+                    <a:pt x="162955" y="3356809"/>
+                  </a:lnTo>
+                  <a:lnTo>
+                    <a:pt x="194277" y="3434758"/>
+                  </a:lnTo>
+                  <a:lnTo>
+                    <a:pt x="228229" y="3511600"/>
+                  </a:lnTo>
+                  <a:lnTo>
+                    <a:pt x="264770" y="3587244"/>
+                  </a:lnTo>
+                  <a:lnTo>
+                    <a:pt x="303859" y="3661603"/>
+                  </a:lnTo>
+                  <a:lnTo>
+                    <a:pt x="345451" y="3734593"/>
+                  </a:lnTo>
+                  <a:lnTo>
+                    <a:pt x="389497" y="3806128"/>
+                  </a:lnTo>
+                  <a:lnTo>
+                    <a:pt x="435946" y="3876126"/>
+                  </a:lnTo>
+                  <a:lnTo>
+                    <a:pt x="484746" y="3944506"/>
+                  </a:lnTo>
+                  <a:lnTo>
+                    <a:pt x="535839" y="4011190"/>
+                  </a:lnTo>
+                  <a:lnTo>
+                    <a:pt x="589168" y="4076101"/>
+                  </a:lnTo>
+                  <a:lnTo>
+                    <a:pt x="644669" y="4139163"/>
+                  </a:lnTo>
+                  <a:lnTo>
+                    <a:pt x="702281" y="4200304"/>
+                  </a:lnTo>
+                  <a:lnTo>
+                    <a:pt x="761935" y="4259454"/>
+                  </a:lnTo>
+                  <a:lnTo>
+                    <a:pt x="823563" y="4316544"/>
+                  </a:lnTo>
+                  <a:lnTo>
+                    <a:pt x="887094" y="4371508"/>
+                  </a:lnTo>
+                  <a:lnTo>
+                    <a:pt x="952455" y="4424284"/>
+                  </a:lnTo>
+                  <a:lnTo>
+                    <a:pt x="1019570" y="4474809"/>
+                  </a:lnTo>
+                  <a:lnTo>
+                    <a:pt x="1088363" y="4523026"/>
+                  </a:lnTo>
+                  <a:lnTo>
+                    <a:pt x="1158753" y="4568880"/>
+                  </a:lnTo>
+                  <a:lnTo>
+                    <a:pt x="1230659" y="4612317"/>
+                  </a:lnTo>
+                  <a:lnTo>
+                    <a:pt x="1303999" y="4653287"/>
+                  </a:lnTo>
+                  <a:lnTo>
+                    <a:pt x="1378688" y="4691743"/>
+                  </a:lnTo>
+                  <a:lnTo>
+                    <a:pt x="1454640" y="4727641"/>
+                  </a:lnTo>
+                  <a:lnTo>
+                    <a:pt x="1531766" y="4760939"/>
+                  </a:lnTo>
+                  <a:lnTo>
+                    <a:pt x="1609979" y="4791599"/>
+                  </a:lnTo>
+                  <a:lnTo>
+                    <a:pt x="1689188" y="4819585"/>
+                  </a:lnTo>
+                  <a:lnTo>
+                    <a:pt x="1769302" y="4844866"/>
+                  </a:lnTo>
+                  <a:lnTo>
+                    <a:pt x="1850228" y="4867411"/>
+                  </a:lnTo>
+                  <a:lnTo>
+                    <a:pt x="1931873" y="4887196"/>
+                  </a:lnTo>
+                  <a:lnTo>
+                    <a:pt x="2014142" y="4904196"/>
+                  </a:lnTo>
+                  <a:lnTo>
+                    <a:pt x="2096941" y="4918394"/>
+                  </a:lnTo>
+                  <a:lnTo>
+                    <a:pt x="2180175" y="4929771"/>
+                  </a:lnTo>
+                  <a:lnTo>
+                    <a:pt x="2263747" y="4938316"/>
+                  </a:lnTo>
+                  <a:lnTo>
+                    <a:pt x="2347561" y="4944018"/>
+                  </a:lnTo>
+                  <a:lnTo>
+                    <a:pt x="2431520" y="4946871"/>
+                  </a:lnTo>
+                  <a:lnTo>
+                    <a:pt x="2515528" y="4946871"/>
+                  </a:lnTo>
+                  <a:lnTo>
+                    <a:pt x="2599487" y="4944018"/>
+                  </a:lnTo>
+                  <a:lnTo>
+                    <a:pt x="2683301" y="4938316"/>
+                  </a:lnTo>
+                  <a:lnTo>
+                    <a:pt x="2766873" y="4929771"/>
+                  </a:lnTo>
+                  <a:lnTo>
+                    <a:pt x="2850107" y="4918394"/>
+                  </a:lnTo>
+                  <a:lnTo>
+                    <a:pt x="2932906" y="4904196"/>
+                  </a:lnTo>
+                  <a:lnTo>
+                    <a:pt x="3015176" y="4887196"/>
+                  </a:lnTo>
+                  <a:lnTo>
+                    <a:pt x="3096821" y="4867411"/>
+                  </a:lnTo>
+                  <a:lnTo>
+                    <a:pt x="3177747" y="4844866"/>
+                  </a:lnTo>
+                  <a:lnTo>
+                    <a:pt x="3257860" y="4819585"/>
+                  </a:lnTo>
+                  <a:lnTo>
+                    <a:pt x="3337069" y="4791599"/>
+                  </a:lnTo>
+                  <a:lnTo>
+                    <a:pt x="3415282" y="4760939"/>
+                  </a:lnTo>
+                  <a:lnTo>
+                    <a:pt x="3492409" y="4727641"/>
+                  </a:lnTo>
+                  <a:lnTo>
+                    <a:pt x="3568361" y="4691743"/>
+                  </a:lnTo>
+                  <a:lnTo>
+                    <a:pt x="3643049" y="4653287"/>
+                  </a:lnTo>
+                  <a:lnTo>
+                    <a:pt x="3716389" y="4612317"/>
+                  </a:lnTo>
+                  <a:lnTo>
+                    <a:pt x="3788296" y="4568880"/>
+                  </a:lnTo>
+                  <a:lnTo>
+                    <a:pt x="3858686" y="4523026"/>
+                  </a:lnTo>
+                  <a:lnTo>
+                    <a:pt x="3927478" y="4474809"/>
+                  </a:lnTo>
+                  <a:lnTo>
+                    <a:pt x="3994593" y="4424284"/>
+                  </a:lnTo>
+                  <a:lnTo>
+                    <a:pt x="4059954" y="4371508"/>
+                  </a:lnTo>
+                  <a:lnTo>
+                    <a:pt x="4123486" y="4316544"/>
+                  </a:lnTo>
+                  <a:lnTo>
+                    <a:pt x="4185114" y="4259454"/>
+                  </a:lnTo>
+                  <a:lnTo>
+                    <a:pt x="4244768" y="4200304"/>
+                  </a:lnTo>
+                  <a:lnTo>
+                    <a:pt x="4302379" y="4139163"/>
+                  </a:lnTo>
+                  <a:lnTo>
+                    <a:pt x="4357881" y="4076101"/>
+                  </a:lnTo>
+                  <a:lnTo>
+                    <a:pt x="4411209" y="4011190"/>
+                  </a:lnTo>
+                  <a:lnTo>
+                    <a:pt x="4462303" y="3944506"/>
+                  </a:lnTo>
+                  <a:lnTo>
+                    <a:pt x="4511102" y="3876126"/>
+                  </a:lnTo>
+                  <a:lnTo>
+                    <a:pt x="4557552" y="3806128"/>
+                  </a:lnTo>
+                  <a:lnTo>
+                    <a:pt x="4601598" y="3734593"/>
+                  </a:lnTo>
+                  <a:lnTo>
+                    <a:pt x="4643189" y="3661603"/>
+                  </a:lnTo>
+                  <a:lnTo>
+                    <a:pt x="4682278" y="3587244"/>
+                  </a:lnTo>
+                  <a:lnTo>
+                    <a:pt x="4718819" y="3511600"/>
+                  </a:lnTo>
+                  <a:lnTo>
+                    <a:pt x="4752771" y="3434758"/>
+                  </a:lnTo>
+                  <a:lnTo>
+                    <a:pt x="4784094" y="3356809"/>
+                  </a:lnTo>
+                  <a:lnTo>
+                    <a:pt x="4812752" y="3277840"/>
+                  </a:lnTo>
+                  <a:lnTo>
+                    <a:pt x="4838712" y="3197944"/>
+                  </a:lnTo>
+                  <a:lnTo>
+                    <a:pt x="4861943" y="3117212"/>
+                  </a:lnTo>
+                  <a:lnTo>
+                    <a:pt x="4882421" y="3035739"/>
+                  </a:lnTo>
+                  <a:lnTo>
+                    <a:pt x="4900119" y="2953616"/>
+                  </a:lnTo>
+                  <a:lnTo>
+                    <a:pt x="4915019" y="2870941"/>
+                  </a:lnTo>
+                  <a:lnTo>
+                    <a:pt x="4927103" y="2787806"/>
+                  </a:lnTo>
+                  <a:lnTo>
+                    <a:pt x="4936357" y="2704310"/>
+                  </a:lnTo>
+                  <a:lnTo>
+                    <a:pt x="4942770" y="2620547"/>
+                  </a:lnTo>
+                  <a:lnTo>
+                    <a:pt x="4946336" y="2536615"/>
+                  </a:lnTo>
+                  <a:lnTo>
+                    <a:pt x="4947049" y="2452611"/>
+                  </a:lnTo>
+                  <a:lnTo>
+                    <a:pt x="4944909" y="2368630"/>
+                  </a:lnTo>
+                  <a:lnTo>
+                    <a:pt x="4939919" y="2284771"/>
+                  </a:lnTo>
+                  <a:lnTo>
+                    <a:pt x="4932084" y="2201129"/>
+                  </a:lnTo>
+                  <a:lnTo>
+                    <a:pt x="4921414" y="2117802"/>
+                  </a:lnTo>
+                  <a:lnTo>
+                    <a:pt x="4907920" y="2034885"/>
+                  </a:lnTo>
+                  <a:lnTo>
+                    <a:pt x="4891619" y="1952474"/>
+                  </a:lnTo>
+                  <a:lnTo>
+                    <a:pt x="4872528" y="1870664"/>
+                  </a:lnTo>
+                  <a:lnTo>
+                    <a:pt x="4850670" y="1789550"/>
+                  </a:lnTo>
+                  <a:lnTo>
+                    <a:pt x="4826071" y="1709225"/>
+                  </a:lnTo>
+                  <a:lnTo>
+                    <a:pt x="4798758" y="1629781"/>
+                  </a:lnTo>
+                  <a:lnTo>
+                    <a:pt x="4768763" y="1551310"/>
+                  </a:lnTo>
+                  <a:lnTo>
+                    <a:pt x="4736122" y="1473904"/>
+                  </a:lnTo>
+                  <a:lnTo>
+                    <a:pt x="4700870" y="1397650"/>
+                  </a:lnTo>
+                  <a:lnTo>
+                    <a:pt x="4663049" y="1322637"/>
+                  </a:lnTo>
+                  <a:lnTo>
+                    <a:pt x="4622703" y="1248952"/>
+                  </a:lnTo>
+                  <a:lnTo>
+                    <a:pt x="4579879" y="1176680"/>
+                  </a:lnTo>
+                  <a:lnTo>
+                    <a:pt x="4534624" y="1105903"/>
+                  </a:lnTo>
+                  <a:lnTo>
+                    <a:pt x="4486993" y="1036704"/>
+                  </a:lnTo>
+                  <a:lnTo>
+                    <a:pt x="4437039" y="969162"/>
+                  </a:lnTo>
+                  <a:lnTo>
+                    <a:pt x="4384821" y="903355"/>
+                  </a:lnTo>
+                  <a:lnTo>
+                    <a:pt x="4330398" y="839359"/>
+                  </a:lnTo>
+                  <a:lnTo>
+                    <a:pt x="4273833" y="777249"/>
+                  </a:lnTo>
+                  <a:lnTo>
+                    <a:pt x="4215192" y="717094"/>
+                  </a:lnTo>
+                  <a:lnTo>
+                    <a:pt x="4154542" y="658966"/>
+                  </a:lnTo>
+                  <a:lnTo>
+                    <a:pt x="4091953" y="602931"/>
+                  </a:lnTo>
+                  <a:lnTo>
+                    <a:pt x="4027498" y="549053"/>
+                  </a:lnTo>
+                  <a:lnTo>
+                    <a:pt x="3961250" y="497396"/>
+                  </a:lnTo>
+                  <a:lnTo>
+                    <a:pt x="3893287" y="448017"/>
+                  </a:lnTo>
+                  <a:lnTo>
+                    <a:pt x="3823685" y="400975"/>
+                  </a:lnTo>
+                  <a:lnTo>
+                    <a:pt x="3752527" y="356323"/>
+                  </a:lnTo>
+                  <a:lnTo>
+                    <a:pt x="3679893" y="314114"/>
+                  </a:lnTo>
+                  <a:lnTo>
+                    <a:pt x="3605868" y="274395"/>
+                  </a:lnTo>
+                  <a:lnTo>
+                    <a:pt x="3530537" y="237212"/>
+                  </a:lnTo>
+                  <a:lnTo>
+                    <a:pt x="3453987" y="202609"/>
+                  </a:lnTo>
+                  <a:lnTo>
+                    <a:pt x="3376306" y="170626"/>
+                  </a:lnTo>
+                  <a:lnTo>
+                    <a:pt x="3297584" y="141299"/>
+                  </a:lnTo>
+                  <a:lnTo>
+                    <a:pt x="3217911" y="114661"/>
+                  </a:lnTo>
+                  <a:lnTo>
+                    <a:pt x="3137379" y="90745"/>
+                  </a:lnTo>
+                  <a:lnTo>
+                    <a:pt x="3056082" y="69577"/>
+                  </a:lnTo>
+                  <a:lnTo>
+                    <a:pt x="2974113" y="51182"/>
+                  </a:lnTo>
+                  <a:lnTo>
+                    <a:pt x="2891567" y="35580"/>
+                  </a:lnTo>
+                  <a:lnTo>
+                    <a:pt x="2808539" y="22791"/>
+                  </a:lnTo>
+                  <a:lnTo>
+                    <a:pt x="2725124" y="12828"/>
+                  </a:lnTo>
+                  <a:lnTo>
+                    <a:pt x="2641419" y="5704"/>
+                  </a:lnTo>
+                  <a:lnTo>
+                    <a:pt x="2557520" y="1426"/>
+                  </a:lnTo>
+                  <a:lnTo>
+                    <a:pt x="2473524" y="0"/>
+                  </a:lnTo>
+                  <a:lnTo>
+                    <a:pt x="2473524" y="85297"/>
+                  </a:lnTo>
+                  <a:lnTo>
+                    <a:pt x="2473524" y="170594"/>
+                  </a:lnTo>
+                  <a:lnTo>
+                    <a:pt x="2473524" y="255891"/>
+                  </a:lnTo>
+                  <a:lnTo>
+                    <a:pt x="2473524" y="341188"/>
+                  </a:lnTo>
+                  <a:lnTo>
+                    <a:pt x="2473524" y="426485"/>
+                  </a:lnTo>
+                  <a:lnTo>
+                    <a:pt x="2473524" y="511782"/>
+                  </a:lnTo>
+                  <a:lnTo>
+                    <a:pt x="2473524" y="597079"/>
+                  </a:lnTo>
+                  <a:lnTo>
+                    <a:pt x="2473524" y="682376"/>
+                  </a:lnTo>
+                  <a:lnTo>
+                    <a:pt x="2473524" y="767673"/>
+                  </a:lnTo>
+                  <a:lnTo>
+                    <a:pt x="2473524" y="852970"/>
+                  </a:lnTo>
+                  <a:lnTo>
+                    <a:pt x="2473524" y="938267"/>
+                  </a:lnTo>
+                  <a:lnTo>
+                    <a:pt x="2473524" y="1023564"/>
+                  </a:lnTo>
+                  <a:lnTo>
+                    <a:pt x="2473524" y="1108861"/>
+                  </a:lnTo>
+                  <a:lnTo>
+                    <a:pt x="2473524" y="1194158"/>
+                  </a:lnTo>
+                  <a:lnTo>
+                    <a:pt x="2473524" y="1279455"/>
+                  </a:lnTo>
+                  <a:lnTo>
+                    <a:pt x="2473524" y="1364752"/>
+                  </a:lnTo>
+                  <a:lnTo>
+                    <a:pt x="2473524" y="1450049"/>
+                  </a:lnTo>
+                  <a:lnTo>
+                    <a:pt x="2473524" y="1535346"/>
+                  </a:lnTo>
+                  <a:lnTo>
+                    <a:pt x="2473524" y="1620643"/>
+                  </a:lnTo>
+                  <a:lnTo>
+                    <a:pt x="2473524" y="1705940"/>
+                  </a:lnTo>
+                  <a:lnTo>
+                    <a:pt x="2473524" y="1791237"/>
+                  </a:lnTo>
+                  <a:lnTo>
+                    <a:pt x="2473524" y="1876534"/>
+                  </a:lnTo>
+                  <a:lnTo>
+                    <a:pt x="2473524" y="1961831"/>
+                  </a:lnTo>
+                  <a:lnTo>
+                    <a:pt x="2473524" y="2047128"/>
+                  </a:lnTo>
+                  <a:lnTo>
+                    <a:pt x="2473524" y="2132425"/>
+                  </a:lnTo>
+                  <a:lnTo>
+                    <a:pt x="2473524" y="2217722"/>
+                  </a:lnTo>
+                  <a:lnTo>
+                    <a:pt x="2473524" y="2303019"/>
+                  </a:lnTo>
+                  <a:lnTo>
+                    <a:pt x="2473524" y="2388316"/>
+                  </a:lnTo>
+                  <a:close/>
+                </a:path>
+              </a:pathLst>
+            </a:custGeom>
             <a:solidFill>
               <a:srgbClr val="9CC5A1">
                 <a:alpha val="100000"/>
@@ -2313,9 +3056,7 @@
           <p:txBody>
             <a:bodyPr/>
             <a:lstStyle/>
-            <a:p>
-              <a:endParaRPr/>
-            </a:p>
+            <a:p/>
           </p:txBody>
         </p:sp>
         <p:sp>
@@ -2335,10 +3076,10 @@
             <a:noFill/>
           </p:spPr>
           <p:txBody>
-            <a:bodyPr wrap="none" lIns="0" tIns="0" rIns="0" bIns="0" anchor="ctr" anchorCtr="1"/>
+            <a:bodyPr lIns="0" rIns="0" tIns="0" bIns="0" anchorCtr="1" anchor="ctr" wrap="none"/>
             <a:lstStyle/>
             <a:p>
-              <a:pPr marL="0" marR="0" indent="0" algn="l">
+              <a:pPr algn="l" marL="0" marR="0" indent="0">
                 <a:lnSpc>
                   <a:spcPts val="1707"/>
                 </a:lnSpc>
@@ -2381,10 +3122,10 @@
             <a:noFill/>
           </p:spPr>
           <p:txBody>
-            <a:bodyPr wrap="none" lIns="0" tIns="0" rIns="0" bIns="0" anchor="ctr" anchorCtr="1"/>
+            <a:bodyPr lIns="0" rIns="0" tIns="0" bIns="0" anchorCtr="1" anchor="ctr" wrap="none"/>
             <a:lstStyle/>
             <a:p>
-              <a:pPr marL="0" marR="0" indent="0" algn="l">
+              <a:pPr algn="l" marL="0" marR="0" indent="0">
                 <a:lnSpc>
                   <a:spcPts val="1707"/>
                 </a:lnSpc>
@@ -2427,10 +3168,10 @@
             <a:noFill/>
           </p:spPr>
           <p:txBody>
-            <a:bodyPr wrap="none" lIns="0" tIns="0" rIns="0" bIns="0" anchor="ctr" anchorCtr="1"/>
+            <a:bodyPr lIns="0" rIns="0" tIns="0" bIns="0" anchorCtr="1" anchor="ctr" wrap="none"/>
             <a:lstStyle/>
             <a:p>
-              <a:pPr marL="0" marR="0" indent="0" algn="l">
+              <a:pPr algn="l" marL="0" marR="0" indent="0">
                 <a:lnSpc>
                   <a:spcPts val="1320"/>
                 </a:lnSpc>

</xml_diff>